<commit_message>
Updated Lecture 1 with the missing requirements slide 38
</commit_message>
<xml_diff>
--- a/docs/Lecture 1.pptx
+++ b/docs/Lecture 1.pptx
@@ -42,7 +42,8 @@
     <p:sldId id="301" r:id="rId36"/>
     <p:sldId id="302" r:id="rId37"/>
     <p:sldId id="303" r:id="rId38"/>
-    <p:sldId id="277" r:id="rId39"/>
+    <p:sldId id="304" r:id="rId39"/>
+    <p:sldId id="277" r:id="rId40"/>
   </p:sldIdLst>
   <p:sldSz cx="12192000" cy="6858000"/>
   <p:notesSz cx="6858000" cy="9144000"/>
@@ -7679,10 +7680,9 @@
           </a:p>
           <a:p>
             <a:r>
-              <a:rPr lang="en-US" dirty="0" err="1"/>
-              <a:t>Interace</a:t>
-            </a:r>
-            <a:endParaRPr lang="en-US" dirty="0"/>
+              <a:rPr lang="en-US" dirty="0"/>
+              <a:t>Interface</a:t>
+            </a:r>
           </a:p>
           <a:p>
             <a:r>
@@ -8205,6 +8205,135 @@
 </file>
 
 <file path=ppt/slides/slide38.xml><?xml version="1.0" encoding="utf-8"?>
+<p:sld xmlns:a="http://schemas.openxmlformats.org/drawingml/2006/main" xmlns:r="http://schemas.openxmlformats.org/officeDocument/2006/relationships" xmlns:p="http://schemas.openxmlformats.org/presentationml/2006/main">
+  <p:cSld>
+    <p:spTree>
+      <p:nvGrpSpPr>
+        <p:cNvPr id="1" name=""/>
+        <p:cNvGrpSpPr/>
+        <p:nvPr/>
+      </p:nvGrpSpPr>
+      <p:grpSpPr>
+        <a:xfrm>
+          <a:off x="0" y="0"/>
+          <a:ext cx="0" cy="0"/>
+          <a:chOff x="0" y="0"/>
+          <a:chExt cx="0" cy="0"/>
+        </a:xfrm>
+      </p:grpSpPr>
+      <p:sp>
+        <p:nvSpPr>
+          <p:cNvPr id="2" name="Title 1">
+            <a:extLst>
+              <a:ext uri="{FF2B5EF4-FFF2-40B4-BE49-F238E27FC236}">
+                <a16:creationId xmlns:a16="http://schemas.microsoft.com/office/drawing/2014/main" id="{5DC86B64-3F82-9586-CFA6-B072F2E8F204}"/>
+              </a:ext>
+            </a:extLst>
+          </p:cNvPr>
+          <p:cNvSpPr>
+            <a:spLocks noGrp="1"/>
+          </p:cNvSpPr>
+          <p:nvPr>
+            <p:ph type="title"/>
+          </p:nvPr>
+        </p:nvSpPr>
+        <p:spPr/>
+        <p:txBody>
+          <a:bodyPr/>
+          <a:lstStyle/>
+          <a:p>
+            <a:r>
+              <a:rPr lang="en-US" dirty="0"/>
+              <a:t>Example of hierarchical requirements</a:t>
+            </a:r>
+          </a:p>
+        </p:txBody>
+      </p:sp>
+      <p:sp>
+        <p:nvSpPr>
+          <p:cNvPr id="3" name="Content Placeholder 2">
+            <a:extLst>
+              <a:ext uri="{FF2B5EF4-FFF2-40B4-BE49-F238E27FC236}">
+                <a16:creationId xmlns:a16="http://schemas.microsoft.com/office/drawing/2014/main" id="{ABD14BE3-B3DC-ADBB-6599-23BDB99E61A4}"/>
+              </a:ext>
+            </a:extLst>
+          </p:cNvPr>
+          <p:cNvSpPr>
+            <a:spLocks noGrp="1"/>
+          </p:cNvSpPr>
+          <p:nvPr>
+            <p:ph idx="1"/>
+          </p:nvPr>
+        </p:nvSpPr>
+        <p:spPr/>
+        <p:txBody>
+          <a:bodyPr/>
+          <a:lstStyle/>
+          <a:p>
+            <a:r>
+              <a:rPr lang="en-US" dirty="0"/>
+              <a:t>R1.0 The system shall fit into a volume not exceeding 1.0 m^3</a:t>
+            </a:r>
+          </a:p>
+          <a:p>
+            <a:pPr lvl="1"/>
+            <a:r>
+              <a:rPr lang="en-US" dirty="0"/>
+              <a:t>R1.1 The system width shall be between 0.5m and 1.0m </a:t>
+            </a:r>
+          </a:p>
+          <a:p>
+            <a:pPr lvl="1"/>
+            <a:r>
+              <a:rPr lang="en-US" dirty="0"/>
+              <a:t>R1.2 The system height shall be between 0.5m and 1.0m </a:t>
+            </a:r>
+          </a:p>
+          <a:p>
+            <a:pPr lvl="1"/>
+            <a:r>
+              <a:rPr lang="en-US" dirty="0"/>
+              <a:t>R1.3 The system depth shall be between 0.5m and 1.0m</a:t>
+            </a:r>
+          </a:p>
+          <a:p>
+            <a:pPr lvl="1"/>
+            <a:endParaRPr lang="en-US" dirty="0"/>
+          </a:p>
+          <a:p>
+            <a:r>
+              <a:rPr lang="en-US" dirty="0"/>
+              <a:t>R1.0 The system shall have command line options to control execution</a:t>
+            </a:r>
+          </a:p>
+          <a:p>
+            <a:pPr lvl="1"/>
+            <a:r>
+              <a:rPr lang="en-US" dirty="0"/>
+              <a:t>R1.1. The option –help should give the overall information about </a:t>
+            </a:r>
+            <a:r>
+              <a:rPr lang="en-US"/>
+              <a:t>the system</a:t>
+            </a:r>
+            <a:endParaRPr lang="en-US" dirty="0"/>
+          </a:p>
+        </p:txBody>
+      </p:sp>
+    </p:spTree>
+    <p:extLst>
+      <p:ext uri="{BB962C8B-B14F-4D97-AF65-F5344CB8AC3E}">
+        <p14:creationId xmlns:p14="http://schemas.microsoft.com/office/powerpoint/2010/main" val="1848010583"/>
+      </p:ext>
+    </p:extLst>
+  </p:cSld>
+  <p:clrMapOvr>
+    <a:masterClrMapping/>
+  </p:clrMapOvr>
+</p:sld>
+</file>
+
+<file path=ppt/slides/slide39.xml><?xml version="1.0" encoding="utf-8"?>
 <p:sld xmlns:a="http://schemas.openxmlformats.org/drawingml/2006/main" xmlns:r="http://schemas.openxmlformats.org/officeDocument/2006/relationships" xmlns:p="http://schemas.openxmlformats.org/presentationml/2006/main">
   <p:cSld>
     <p:spTree>

</xml_diff>